<commit_message>
aggiunto dev.standard + correzione relazione+presentazione
</commit_message>
<xml_diff>
--- a/Presentazione Hanabi.pptx
+++ b/Presentazione Hanabi.pptx
@@ -309,7 +309,7 @@
           <a:p>
             <a:fld id="{726E6C66-42E2-4C1E-ABE5-1F09CD5CD538}" type="datetimeFigureOut">
               <a:rPr lang="it-IT" smtClean="0"/>
-              <a:t>11/12/2020</a:t>
+              <a:t>15/12/2020</a:t>
             </a:fld>
             <a:endParaRPr lang="it-IT"/>
           </a:p>
@@ -647,7 +647,7 @@
           <a:p>
             <a:fld id="{726E6C66-42E2-4C1E-ABE5-1F09CD5CD538}" type="datetimeFigureOut">
               <a:rPr lang="it-IT" smtClean="0"/>
-              <a:t>11/12/2020</a:t>
+              <a:t>15/12/2020</a:t>
             </a:fld>
             <a:endParaRPr lang="it-IT"/>
           </a:p>
@@ -1048,7 +1048,7 @@
           <a:p>
             <a:fld id="{726E6C66-42E2-4C1E-ABE5-1F09CD5CD538}" type="datetimeFigureOut">
               <a:rPr lang="it-IT" smtClean="0"/>
-              <a:t>11/12/2020</a:t>
+              <a:t>15/12/2020</a:t>
             </a:fld>
             <a:endParaRPr lang="it-IT"/>
           </a:p>
@@ -1384,7 +1384,7 @@
           <a:p>
             <a:fld id="{726E6C66-42E2-4C1E-ABE5-1F09CD5CD538}" type="datetimeFigureOut">
               <a:rPr lang="it-IT" smtClean="0"/>
-              <a:t>11/12/2020</a:t>
+              <a:t>15/12/2020</a:t>
             </a:fld>
             <a:endParaRPr lang="it-IT"/>
           </a:p>
@@ -1704,7 +1704,7 @@
           <a:p>
             <a:fld id="{726E6C66-42E2-4C1E-ABE5-1F09CD5CD538}" type="datetimeFigureOut">
               <a:rPr lang="it-IT" smtClean="0"/>
-              <a:t>11/12/2020</a:t>
+              <a:t>15/12/2020</a:t>
             </a:fld>
             <a:endParaRPr lang="it-IT"/>
           </a:p>
@@ -2100,7 +2100,7 @@
           <a:p>
             <a:fld id="{726E6C66-42E2-4C1E-ABE5-1F09CD5CD538}" type="datetimeFigureOut">
               <a:rPr lang="it-IT" smtClean="0"/>
-              <a:t>11/12/2020</a:t>
+              <a:t>15/12/2020</a:t>
             </a:fld>
             <a:endParaRPr lang="it-IT"/>
           </a:p>
@@ -2357,7 +2357,7 @@
           <a:p>
             <a:fld id="{726E6C66-42E2-4C1E-ABE5-1F09CD5CD538}" type="datetimeFigureOut">
               <a:rPr lang="it-IT" smtClean="0"/>
-              <a:t>11/12/2020</a:t>
+              <a:t>15/12/2020</a:t>
             </a:fld>
             <a:endParaRPr lang="it-IT"/>
           </a:p>
@@ -2619,7 +2619,7 @@
           <a:p>
             <a:fld id="{726E6C66-42E2-4C1E-ABE5-1F09CD5CD538}" type="datetimeFigureOut">
               <a:rPr lang="it-IT" smtClean="0"/>
-              <a:t>11/12/2020</a:t>
+              <a:t>15/12/2020</a:t>
             </a:fld>
             <a:endParaRPr lang="it-IT"/>
           </a:p>
@@ -2881,7 +2881,7 @@
           <a:p>
             <a:fld id="{726E6C66-42E2-4C1E-ABE5-1F09CD5CD538}" type="datetimeFigureOut">
               <a:rPr lang="it-IT" smtClean="0"/>
-              <a:t>11/12/2020</a:t>
+              <a:t>15/12/2020</a:t>
             </a:fld>
             <a:endParaRPr lang="it-IT"/>
           </a:p>
@@ -3210,7 +3210,7 @@
           <a:p>
             <a:fld id="{726E6C66-42E2-4C1E-ABE5-1F09CD5CD538}" type="datetimeFigureOut">
               <a:rPr lang="it-IT" smtClean="0"/>
-              <a:t>11/12/2020</a:t>
+              <a:t>15/12/2020</a:t>
             </a:fld>
             <a:endParaRPr lang="it-IT"/>
           </a:p>
@@ -3533,7 +3533,7 @@
           <a:p>
             <a:fld id="{726E6C66-42E2-4C1E-ABE5-1F09CD5CD538}" type="datetimeFigureOut">
               <a:rPr lang="it-IT" smtClean="0"/>
-              <a:t>11/12/2020</a:t>
+              <a:t>15/12/2020</a:t>
             </a:fld>
             <a:endParaRPr lang="it-IT"/>
           </a:p>
@@ -3990,7 +3990,7 @@
           <a:p>
             <a:fld id="{726E6C66-42E2-4C1E-ABE5-1F09CD5CD538}" type="datetimeFigureOut">
               <a:rPr lang="it-IT" smtClean="0"/>
-              <a:t>11/12/2020</a:t>
+              <a:t>15/12/2020</a:t>
             </a:fld>
             <a:endParaRPr lang="it-IT"/>
           </a:p>
@@ -4195,7 +4195,7 @@
           <a:p>
             <a:fld id="{726E6C66-42E2-4C1E-ABE5-1F09CD5CD538}" type="datetimeFigureOut">
               <a:rPr lang="it-IT" smtClean="0"/>
-              <a:t>11/12/2020</a:t>
+              <a:t>15/12/2020</a:t>
             </a:fld>
             <a:endParaRPr lang="it-IT"/>
           </a:p>
@@ -4372,7 +4372,7 @@
           <a:p>
             <a:fld id="{726E6C66-42E2-4C1E-ABE5-1F09CD5CD538}" type="datetimeFigureOut">
               <a:rPr lang="it-IT" smtClean="0"/>
-              <a:t>11/12/2020</a:t>
+              <a:t>15/12/2020</a:t>
             </a:fld>
             <a:endParaRPr lang="it-IT"/>
           </a:p>
@@ -4705,7 +4705,7 @@
           <a:p>
             <a:fld id="{726E6C66-42E2-4C1E-ABE5-1F09CD5CD538}" type="datetimeFigureOut">
               <a:rPr lang="it-IT" smtClean="0"/>
-              <a:t>11/12/2020</a:t>
+              <a:t>15/12/2020</a:t>
             </a:fld>
             <a:endParaRPr lang="it-IT"/>
           </a:p>
@@ -5050,7 +5050,7 @@
           <a:p>
             <a:fld id="{726E6C66-42E2-4C1E-ABE5-1F09CD5CD538}" type="datetimeFigureOut">
               <a:rPr lang="it-IT" smtClean="0"/>
-              <a:t>11/12/2020</a:t>
+              <a:t>15/12/2020</a:t>
             </a:fld>
             <a:endParaRPr lang="it-IT"/>
           </a:p>
@@ -7167,7 +7167,7 @@
           <a:p>
             <a:fld id="{726E6C66-42E2-4C1E-ABE5-1F09CD5CD538}" type="datetimeFigureOut">
               <a:rPr lang="it-IT" smtClean="0"/>
-              <a:t>11/12/2020</a:t>
+              <a:t>15/12/2020</a:t>
             </a:fld>
             <a:endParaRPr lang="it-IT"/>
           </a:p>
@@ -7828,9 +7828,16 @@
             <p:ph idx="1"/>
           </p:nvPr>
         </p:nvSpPr>
-        <p:spPr/>
-        <p:txBody>
-          <a:bodyPr/>
+        <p:spPr>
+          <a:xfrm>
+            <a:off x="1907822" y="2133600"/>
+            <a:ext cx="9596790" cy="2122311"/>
+          </a:xfrm>
+        </p:spPr>
+        <p:txBody>
+          <a:bodyPr>
+            <a:normAutofit/>
+          </a:bodyPr>
           <a:lstStyle/>
           <a:p>
             <a:r>
@@ -7847,17 +7854,426 @@
           <a:p>
             <a:r>
               <a:rPr lang="it-IT" dirty="0"/>
-              <a:t>Inserisci punteggi medi dei due bot (medie su 100 partite)</a:t>
-            </a:r>
-          </a:p>
-          <a:p>
-            <a:r>
-              <a:rPr lang="it-IT" dirty="0"/>
-              <a:t>Le prestazioni possono essere migliorate con l’introduzione di convenzioni.</a:t>
-            </a:r>
-          </a:p>
-        </p:txBody>
-      </p:sp>
+              <a:t>Le prestazioni possono essere migliorate con l’introduzione di convenzioni</a:t>
+            </a:r>
+          </a:p>
+        </p:txBody>
+      </p:sp>
+      <p:graphicFrame>
+        <p:nvGraphicFramePr>
+          <p:cNvPr id="4" name="Tabella 4">
+            <a:extLst>
+              <a:ext uri="{FF2B5EF4-FFF2-40B4-BE49-F238E27FC236}">
+                <a16:creationId xmlns:a16="http://schemas.microsoft.com/office/drawing/2014/main" id="{0EFAEAFF-7D95-4DCC-A4E0-53E809C1B829}"/>
+              </a:ext>
+            </a:extLst>
+          </p:cNvPr>
+          <p:cNvGraphicFramePr>
+            <a:graphicFrameLocks noGrp="1"/>
+          </p:cNvGraphicFramePr>
+          <p:nvPr>
+            <p:extLst>
+              <p:ext uri="{D42A27DB-BD31-4B8C-83A1-F6EECF244321}">
+                <p14:modId xmlns:p14="http://schemas.microsoft.com/office/powerpoint/2010/main" val="2253053919"/>
+              </p:ext>
+            </p:extLst>
+          </p:nvPr>
+        </p:nvGraphicFramePr>
+        <p:xfrm>
+          <a:off x="564444" y="4507088"/>
+          <a:ext cx="10940176" cy="2103120"/>
+        </p:xfrm>
+        <a:graphic>
+          <a:graphicData uri="http://schemas.openxmlformats.org/drawingml/2006/table">
+            <a:tbl>
+              <a:tblPr firstRow="1" bandRow="1">
+                <a:tableStyleId>{5C22544A-7EE6-4342-B048-85BDC9FD1C3A}</a:tableStyleId>
+              </a:tblPr>
+              <a:tblGrid>
+                <a:gridCol w="2735044">
+                  <a:extLst>
+                    <a:ext uri="{9D8B030D-6E8A-4147-A177-3AD203B41FA5}">
+                      <a16:colId xmlns:a16="http://schemas.microsoft.com/office/drawing/2014/main" val="2397050885"/>
+                    </a:ext>
+                  </a:extLst>
+                </a:gridCol>
+                <a:gridCol w="2735044">
+                  <a:extLst>
+                    <a:ext uri="{9D8B030D-6E8A-4147-A177-3AD203B41FA5}">
+                      <a16:colId xmlns:a16="http://schemas.microsoft.com/office/drawing/2014/main" val="2756279651"/>
+                    </a:ext>
+                  </a:extLst>
+                </a:gridCol>
+                <a:gridCol w="2735044">
+                  <a:extLst>
+                    <a:ext uri="{9D8B030D-6E8A-4147-A177-3AD203B41FA5}">
+                      <a16:colId xmlns:a16="http://schemas.microsoft.com/office/drawing/2014/main" val="4106987487"/>
+                    </a:ext>
+                  </a:extLst>
+                </a:gridCol>
+                <a:gridCol w="2735044">
+                  <a:extLst>
+                    <a:ext uri="{9D8B030D-6E8A-4147-A177-3AD203B41FA5}">
+                      <a16:colId xmlns:a16="http://schemas.microsoft.com/office/drawing/2014/main" val="3518336349"/>
+                    </a:ext>
+                  </a:extLst>
+                </a:gridCol>
+              </a:tblGrid>
+              <a:tr h="332875">
+                <a:tc>
+                  <a:txBody>
+                    <a:bodyPr/>
+                    <a:lstStyle/>
+                    <a:p>
+                      <a:pPr algn="ctr"/>
+                      <a:r>
+                        <a:rPr lang="it-IT" dirty="0"/>
+                        <a:t>Giocatori</a:t>
+                      </a:r>
+                    </a:p>
+                  </a:txBody>
+                  <a:tcPr/>
+                </a:tc>
+                <a:tc>
+                  <a:txBody>
+                    <a:bodyPr/>
+                    <a:lstStyle/>
+                    <a:p>
+                      <a:pPr algn="ctr"/>
+                      <a:r>
+                        <a:rPr lang="it-IT" dirty="0"/>
+                        <a:t>Bot1</a:t>
+                      </a:r>
+                    </a:p>
+                  </a:txBody>
+                  <a:tcPr/>
+                </a:tc>
+                <a:tc>
+                  <a:txBody>
+                    <a:bodyPr/>
+                    <a:lstStyle/>
+                    <a:p>
+                      <a:pPr algn="ctr"/>
+                      <a:r>
+                        <a:rPr lang="it-IT" dirty="0"/>
+                        <a:t>Bot2</a:t>
+                      </a:r>
+                    </a:p>
+                  </a:txBody>
+                  <a:tcPr/>
+                </a:tc>
+                <a:tc>
+                  <a:txBody>
+                    <a:bodyPr/>
+                    <a:lstStyle/>
+                    <a:p>
+                      <a:pPr algn="ctr"/>
+                      <a:r>
+                        <a:rPr lang="it-IT" dirty="0"/>
+                        <a:t>Bot1/Bot2</a:t>
+                      </a:r>
+                    </a:p>
+                  </a:txBody>
+                  <a:tcPr/>
+                </a:tc>
+                <a:extLst>
+                  <a:ext uri="{0D108BD9-81ED-4DB2-BD59-A6C34878D82A}">
+                    <a16:rowId xmlns:a16="http://schemas.microsoft.com/office/drawing/2014/main" val="4123375653"/>
+                  </a:ext>
+                </a:extLst>
+              </a:tr>
+              <a:tr h="332875">
+                <a:tc>
+                  <a:txBody>
+                    <a:bodyPr/>
+                    <a:lstStyle/>
+                    <a:p>
+                      <a:pPr algn="ctr"/>
+                      <a:r>
+                        <a:rPr lang="it-IT" dirty="0"/>
+                        <a:t>2</a:t>
+                      </a:r>
+                    </a:p>
+                  </a:txBody>
+                  <a:tcPr/>
+                </a:tc>
+                <a:tc>
+                  <a:txBody>
+                    <a:bodyPr/>
+                    <a:lstStyle/>
+                    <a:p>
+                      <a:pPr algn="ctr"/>
+                      <a:r>
+                        <a:rPr lang="it-IT" dirty="0"/>
+                        <a:t>11.77|2.88|17|6 </a:t>
+                      </a:r>
+                    </a:p>
+                  </a:txBody>
+                  <a:tcPr/>
+                </a:tc>
+                <a:tc>
+                  <a:txBody>
+                    <a:bodyPr/>
+                    <a:lstStyle/>
+                    <a:p>
+                      <a:pPr algn="ctr"/>
+                      <a:r>
+                        <a:rPr lang="it-IT" dirty="0"/>
+                        <a:t>14.37|3.07|20|8 </a:t>
+                      </a:r>
+                    </a:p>
+                  </a:txBody>
+                  <a:tcPr/>
+                </a:tc>
+                <a:tc>
+                  <a:txBody>
+                    <a:bodyPr/>
+                    <a:lstStyle/>
+                    <a:p>
+                      <a:pPr algn="ctr"/>
+                      <a:r>
+                        <a:rPr lang="it-IT" dirty="0"/>
+                        <a:t>12.71|2.90|19|8</a:t>
+                      </a:r>
+                    </a:p>
+                  </a:txBody>
+                  <a:tcPr/>
+                </a:tc>
+                <a:extLst>
+                  <a:ext uri="{0D108BD9-81ED-4DB2-BD59-A6C34878D82A}">
+                    <a16:rowId xmlns:a16="http://schemas.microsoft.com/office/drawing/2014/main" val="1560268614"/>
+                  </a:ext>
+                </a:extLst>
+              </a:tr>
+              <a:tr h="332875">
+                <a:tc>
+                  <a:txBody>
+                    <a:bodyPr/>
+                    <a:lstStyle/>
+                    <a:p>
+                      <a:pPr algn="ctr"/>
+                      <a:r>
+                        <a:rPr lang="it-IT" dirty="0"/>
+                        <a:t>3</a:t>
+                      </a:r>
+                    </a:p>
+                  </a:txBody>
+                  <a:tcPr/>
+                </a:tc>
+                <a:tc>
+                  <a:txBody>
+                    <a:bodyPr/>
+                    <a:lstStyle/>
+                    <a:p>
+                      <a:pPr algn="ctr"/>
+                      <a:r>
+                        <a:rPr lang="it-IT" b="1" dirty="0"/>
+                        <a:t>11.81</a:t>
+                      </a:r>
+                      <a:r>
+                        <a:rPr lang="it-IT" dirty="0"/>
+                        <a:t>|2.48|17|6 </a:t>
+                      </a:r>
+                    </a:p>
+                  </a:txBody>
+                  <a:tcPr/>
+                </a:tc>
+                <a:tc>
+                  <a:txBody>
+                    <a:bodyPr/>
+                    <a:lstStyle/>
+                    <a:p>
+                      <a:pPr algn="ctr"/>
+                      <a:r>
+                        <a:rPr lang="it-IT" b="1" dirty="0"/>
+                        <a:t>17.65</a:t>
+                      </a:r>
+                      <a:r>
+                        <a:rPr lang="it-IT" dirty="0"/>
+                        <a:t>|1.53|21|13</a:t>
+                      </a:r>
+                    </a:p>
+                  </a:txBody>
+                  <a:tcPr/>
+                </a:tc>
+                <a:tc>
+                  <a:txBody>
+                    <a:bodyPr/>
+                    <a:lstStyle/>
+                    <a:p>
+                      <a:pPr algn="ctr"/>
+                      <a:r>
+                        <a:rPr lang="it-IT" b="1" dirty="0"/>
+                        <a:t>15.14</a:t>
+                      </a:r>
+                      <a:r>
+                        <a:rPr lang="it-IT" dirty="0"/>
+                        <a:t>|2.24|18(2)| 8(2) </a:t>
+                      </a:r>
+                    </a:p>
+                  </a:txBody>
+                  <a:tcPr/>
+                </a:tc>
+                <a:extLst>
+                  <a:ext uri="{0D108BD9-81ED-4DB2-BD59-A6C34878D82A}">
+                    <a16:rowId xmlns:a16="http://schemas.microsoft.com/office/drawing/2014/main" val="2064682153"/>
+                  </a:ext>
+                </a:extLst>
+              </a:tr>
+              <a:tr h="332875">
+                <a:tc>
+                  <a:txBody>
+                    <a:bodyPr/>
+                    <a:lstStyle/>
+                    <a:p>
+                      <a:pPr algn="ctr"/>
+                      <a:r>
+                        <a:rPr lang="it-IT" dirty="0"/>
+                        <a:t>4</a:t>
+                      </a:r>
+                    </a:p>
+                  </a:txBody>
+                  <a:tcPr/>
+                </a:tc>
+                <a:tc>
+                  <a:txBody>
+                    <a:bodyPr/>
+                    <a:lstStyle/>
+                    <a:p>
+                      <a:pPr algn="ctr"/>
+                      <a:r>
+                        <a:rPr lang="it-IT" dirty="0"/>
+                        <a:t>8.86|2.15|14|2 </a:t>
+                      </a:r>
+                    </a:p>
+                  </a:txBody>
+                  <a:tcPr/>
+                </a:tc>
+                <a:tc>
+                  <a:txBody>
+                    <a:bodyPr/>
+                    <a:lstStyle/>
+                    <a:p>
+                      <a:pPr algn="ctr"/>
+                      <a:r>
+                        <a:rPr lang="it-IT" dirty="0"/>
+                        <a:t>17.25|1.31|20|14 </a:t>
+                      </a:r>
+                    </a:p>
+                  </a:txBody>
+                  <a:tcPr/>
+                </a:tc>
+                <a:tc>
+                  <a:txBody>
+                    <a:bodyPr/>
+                    <a:lstStyle/>
+                    <a:p>
+                      <a:pPr algn="ctr"/>
+                      <a:r>
+                        <a:rPr lang="it-IT" dirty="0"/>
+                        <a:t>13.35|2.17|19|7</a:t>
+                      </a:r>
+                    </a:p>
+                  </a:txBody>
+                  <a:tcPr/>
+                </a:tc>
+                <a:extLst>
+                  <a:ext uri="{0D108BD9-81ED-4DB2-BD59-A6C34878D82A}">
+                    <a16:rowId xmlns:a16="http://schemas.microsoft.com/office/drawing/2014/main" val="433690846"/>
+                  </a:ext>
+                </a:extLst>
+              </a:tr>
+              <a:tr h="582531">
+                <a:tc>
+                  <a:txBody>
+                    <a:bodyPr/>
+                    <a:lstStyle/>
+                    <a:p>
+                      <a:pPr algn="ctr"/>
+                      <a:r>
+                        <a:rPr lang="it-IT" dirty="0"/>
+                        <a:t>5</a:t>
+                      </a:r>
+                    </a:p>
+                  </a:txBody>
+                  <a:tcPr/>
+                </a:tc>
+                <a:tc>
+                  <a:txBody>
+                    <a:bodyPr/>
+                    <a:lstStyle/>
+                    <a:p>
+                      <a:pPr algn="ctr"/>
+                      <a:r>
+                        <a:rPr lang="it-IT" u="none" dirty="0"/>
+                        <a:t>9.44|2.11|15|4</a:t>
+                      </a:r>
+                      <a:r>
+                        <a:rPr lang="it-IT" dirty="0"/>
+                        <a:t> </a:t>
+                      </a:r>
+                    </a:p>
+                  </a:txBody>
+                  <a:tcPr/>
+                </a:tc>
+                <a:tc>
+                  <a:txBody>
+                    <a:bodyPr/>
+                    <a:lstStyle/>
+                    <a:p>
+                      <a:pPr algn="ctr"/>
+                      <a:r>
+                        <a:rPr lang="it-IT" dirty="0"/>
+                        <a:t>16.33|1.11|19|14 </a:t>
+                      </a:r>
+                    </a:p>
+                  </a:txBody>
+                  <a:tcPr/>
+                </a:tc>
+                <a:tc>
+                  <a:txBody>
+                    <a:bodyPr/>
+                    <a:lstStyle/>
+                    <a:p>
+                      <a:pPr marL="0" marR="0" lvl="0" indent="0" algn="ctr" defTabSz="457200" rtl="0" eaLnBrk="1" fontAlgn="auto" latinLnBrk="0" hangingPunct="1">
+                        <a:lnSpc>
+                          <a:spcPct val="100000"/>
+                        </a:lnSpc>
+                        <a:spcBef>
+                          <a:spcPts val="0"/>
+                        </a:spcBef>
+                        <a:spcAft>
+                          <a:spcPts val="0"/>
+                        </a:spcAft>
+                        <a:buClrTx/>
+                        <a:buSzTx/>
+                        <a:buFontTx/>
+                        <a:buNone/>
+                        <a:tabLst/>
+                        <a:defRPr/>
+                      </a:pPr>
+                      <a:r>
+                        <a:rPr lang="it-IT" dirty="0"/>
+                        <a:t>13.12|1.75|17(2)|8(1)</a:t>
+                      </a:r>
+                    </a:p>
+                    <a:p>
+                      <a:pPr algn="ctr"/>
+                      <a:endParaRPr lang="it-IT" dirty="0"/>
+                    </a:p>
+                  </a:txBody>
+                  <a:tcPr/>
+                </a:tc>
+                <a:extLst>
+                  <a:ext uri="{0D108BD9-81ED-4DB2-BD59-A6C34878D82A}">
+                    <a16:rowId xmlns:a16="http://schemas.microsoft.com/office/drawing/2014/main" val="2888634889"/>
+                  </a:ext>
+                </a:extLst>
+              </a:tr>
+            </a:tbl>
+          </a:graphicData>
+        </a:graphic>
+      </p:graphicFrame>
     </p:spTree>
     <p:extLst>
       <p:ext uri="{BB962C8B-B14F-4D97-AF65-F5344CB8AC3E}">
@@ -8354,7 +8770,14 @@
           <a:p>
             <a:r>
               <a:rPr lang="it-IT" dirty="0"/>
-              <a:t>Tuttavia così facendo si genera un elevato numero di stati da esplorare. Inoltre più si avanza nell’esplorazione più i risultati ottenuti diventano probabilistici.</a:t>
+              <a:t>Tuttavia così facendo si genera un elevato numero di stati da esplorare.</a:t>
+            </a:r>
+            <a:br>
+              <a:rPr lang="it-IT" dirty="0"/>
+            </a:br>
+            <a:r>
+              <a:rPr lang="it-IT" dirty="0"/>
+              <a:t>Inoltre più si avanza nell’esplorazione più i risultati ottenuti diventano probabilistici.</a:t>
             </a:r>
           </a:p>
         </p:txBody>
@@ -8440,43 +8863,19 @@
           <a:p>
             <a:r>
               <a:rPr lang="it-IT" dirty="0"/>
-              <a:t>Usiamo un’esplorazione degli stati più prossimi da quello attuale (a distanza 1) e scegliamo la mossa in funzione di due parametri: </a:t>
-            </a:r>
-            <a:r>
-              <a:rPr lang="it-IT" dirty="0" err="1"/>
-              <a:t>playability</a:t>
-            </a:r>
+              <a:t>Usiamo un’esplorazione degli stati più prossimi da quello attuale (a distanza 1) e scegliamo la mossa in funzione di due parametri: giocabilità e inutilità .</a:t>
+            </a:r>
+          </a:p>
+          <a:p>
             <a:r>
               <a:rPr lang="it-IT" dirty="0"/>
-              <a:t> e </a:t>
-            </a:r>
-            <a:r>
-              <a:rPr lang="it-IT" dirty="0" err="1"/>
-              <a:t>uselessness</a:t>
-            </a:r>
+              <a:t>Giocabilità indica la sicurezza che si ha nel giocare una determinata carta, ovvero la probabilità che una volta giocata la carta essa non si commetta errore.</a:t>
+            </a:r>
+          </a:p>
+          <a:p>
             <a:r>
               <a:rPr lang="it-IT" dirty="0"/>
-              <a:t> .</a:t>
-            </a:r>
-          </a:p>
-          <a:p>
-            <a:r>
-              <a:rPr lang="it-IT" dirty="0" err="1"/>
-              <a:t>Playability</a:t>
-            </a:r>
-            <a:r>
-              <a:rPr lang="it-IT" dirty="0"/>
-              <a:t> indica la sicurezza che si ha nel giocare una determinata carta, ovvero la probabilità che una volta giocata la carta essa non si commetta errore.</a:t>
-            </a:r>
-          </a:p>
-          <a:p>
-            <a:r>
-              <a:rPr lang="it-IT" dirty="0" err="1"/>
-              <a:t>Uselessness</a:t>
-            </a:r>
-            <a:r>
-              <a:rPr lang="it-IT" dirty="0"/>
-              <a:t> indica la sicurezza che si ha nello scartare una determinata carta, ovvero la probabilità che scartandola non si comprometta il risultato massimo raggiungibile</a:t>
+              <a:t>Inutilità indica la sicurezza che si ha nello scartare una determinata carta, ovvero la probabilità che scartandola non si comprometta il risultato massimo raggiungibile</a:t>
             </a:r>
           </a:p>
         </p:txBody>
@@ -8774,50 +9173,47 @@
           <a:p>
             <a:r>
               <a:rPr lang="it-IT" dirty="0"/>
-              <a:t>Definire una formula che permetta di calcolare </a:t>
-            </a:r>
-            <a:r>
-              <a:rPr lang="it-IT" dirty="0" err="1"/>
-              <a:t>playability</a:t>
-            </a:r>
+              <a:t>Definire una formula che permetta di calcolare giocabilità e inutilità si è rivelato difficile.</a:t>
+            </a:r>
+          </a:p>
+          <a:p>
             <a:r>
               <a:rPr lang="it-IT" dirty="0"/>
-              <a:t> e </a:t>
-            </a:r>
-            <a:r>
-              <a:rPr lang="it-IT" dirty="0" err="1"/>
-              <a:t>uselessness</a:t>
-            </a:r>
+              <a:t>Giocabilità e inutilità di una data carta sono calcolate sommando per ogni tipo di carta giocabile/inutile le probabilità che la carta data sia proprio di quel tipo.</a:t>
+            </a:r>
+          </a:p>
+          <a:p>
             <a:r>
               <a:rPr lang="it-IT" dirty="0"/>
-              <a:t> si è rivelato difficile.</a:t>
+              <a:t>Una carta è giocabile se la scala del suo colore ha valore precedente a quello della carta data.</a:t>
             </a:r>
           </a:p>
           <a:p>
             <a:r>
               <a:rPr lang="it-IT" dirty="0"/>
-              <a:t>Data una carta, la sua </a:t>
-            </a:r>
-            <a:r>
-              <a:rPr lang="it-IT" dirty="0" err="1"/>
-              <a:t>playability</a:t>
-            </a:r>
-            <a:r>
-              <a:rPr lang="it-IT" dirty="0"/>
-              <a:t> è ottenuta contando quante delle carte che quella data potrebbe essere sono giocabili in sicurezza.</a:t>
+              <a:t>Una carta è inutile se:</a:t>
             </a:r>
             <a:br>
               <a:rPr lang="it-IT" dirty="0"/>
             </a:br>
             <a:r>
               <a:rPr lang="it-IT" dirty="0"/>
-              <a:t>Un processo analogo è usato per il calcolo della </a:t>
-            </a:r>
-            <a:r>
-              <a:rPr lang="it-IT" dirty="0" err="1"/>
-              <a:t>uselessness</a:t>
-            </a:r>
-            <a:endParaRPr lang="it-IT" dirty="0"/>
+              <a:t>- La scala dello stesso colore ha valore maggiore o uguale della carta</a:t>
+            </a:r>
+            <a:br>
+              <a:rPr lang="it-IT" dirty="0"/>
+            </a:br>
+            <a:r>
+              <a:rPr lang="it-IT" dirty="0"/>
+              <a:t>- Tra gli scarti sono presenti tutti gli esemplari di carte di stesso colore e uno qualsiasi dei valori inferiori</a:t>
+            </a:r>
+            <a:br>
+              <a:rPr lang="it-IT" dirty="0"/>
+            </a:br>
+            <a:r>
+              <a:rPr lang="it-IT" dirty="0"/>
+              <a:t>- Almeno una copia della carta è nel mazzo o in mano ad un compagno</a:t>
+            </a:r>
           </a:p>
         </p:txBody>
       </p:sp>

</xml_diff>